<commit_message>
Updated README.md and requirements.txt
</commit_message>
<xml_diff>
--- a/temp.pptx
+++ b/temp.pptx
@@ -3241,7 +3241,7 @@
               <a:spcAft>
                 <a:spcPts val="0"/>
               </a:spcAft>
-              <a:defRPr sz="1400">
+              <a:defRPr sz="3600">
                 <a:solidFill>
                   <a:srgbClr val="FFFFFF"/>
                 </a:solidFill>
@@ -3316,7 +3316,7 @@
               <a:spcAft>
                 <a:spcPts val="0"/>
               </a:spcAft>
-              <a:defRPr sz="1400">
+              <a:defRPr sz="3600">
                 <a:solidFill>
                   <a:srgbClr val="FFFFFF"/>
                 </a:solidFill>
@@ -3391,7 +3391,7 @@
               <a:spcAft>
                 <a:spcPts val="0"/>
               </a:spcAft>
-              <a:defRPr sz="1400">
+              <a:defRPr sz="3600">
                 <a:solidFill>
                   <a:srgbClr val="FFFFFF"/>
                 </a:solidFill>
@@ -3466,7 +3466,7 @@
               <a:spcAft>
                 <a:spcPts val="0"/>
               </a:spcAft>
-              <a:defRPr sz="1400">
+              <a:defRPr sz="3600">
                 <a:solidFill>
                   <a:srgbClr val="FFFFFF"/>
                 </a:solidFill>
@@ -3541,7 +3541,7 @@
               <a:spcAft>
                 <a:spcPts val="0"/>
               </a:spcAft>
-              <a:defRPr sz="1400">
+              <a:defRPr sz="3600">
                 <a:solidFill>
                   <a:srgbClr val="FFFFFF"/>
                 </a:solidFill>
@@ -3616,7 +3616,7 @@
               <a:spcAft>
                 <a:spcPts val="0"/>
               </a:spcAft>
-              <a:defRPr sz="1400">
+              <a:defRPr sz="3600">
                 <a:solidFill>
                   <a:srgbClr val="FFFFFF"/>
                 </a:solidFill>
@@ -3691,7 +3691,7 @@
               <a:spcAft>
                 <a:spcPts val="0"/>
               </a:spcAft>
-              <a:defRPr sz="1400">
+              <a:defRPr sz="3600">
                 <a:solidFill>
                   <a:srgbClr val="FFFFFF"/>
                 </a:solidFill>
@@ -3766,7 +3766,7 @@
               <a:spcAft>
                 <a:spcPts val="0"/>
               </a:spcAft>
-              <a:defRPr sz="1400">
+              <a:defRPr sz="3600">
                 <a:solidFill>
                   <a:srgbClr val="FFFFFF"/>
                 </a:solidFill>
@@ -3841,7 +3841,7 @@
               <a:spcAft>
                 <a:spcPts val="0"/>
               </a:spcAft>
-              <a:defRPr sz="1400">
+              <a:defRPr sz="3600">
                 <a:solidFill>
                   <a:srgbClr val="FFFFFF"/>
                 </a:solidFill>
@@ -3916,7 +3916,7 @@
               <a:spcAft>
                 <a:spcPts val="0"/>
               </a:spcAft>
-              <a:defRPr sz="1400">
+              <a:defRPr sz="3600">
                 <a:solidFill>
                   <a:srgbClr val="FFFFFF"/>
                 </a:solidFill>
@@ -3995,7 +3995,7 @@
               <a:spcAft>
                 <a:spcPts val="0"/>
               </a:spcAft>
-              <a:defRPr sz="1400">
+              <a:defRPr sz="3600">
                 <a:solidFill>
                   <a:srgbClr val="FFFFFF"/>
                 </a:solidFill>
@@ -4070,7 +4070,7 @@
               <a:spcAft>
                 <a:spcPts val="0"/>
               </a:spcAft>
-              <a:defRPr sz="1400">
+              <a:defRPr sz="3600">
                 <a:solidFill>
                   <a:srgbClr val="FFFFFF"/>
                 </a:solidFill>
@@ -4145,7 +4145,7 @@
               <a:spcAft>
                 <a:spcPts val="0"/>
               </a:spcAft>
-              <a:defRPr sz="1400">
+              <a:defRPr sz="3600">
                 <a:solidFill>
                   <a:srgbClr val="FFFFFF"/>
                 </a:solidFill>
@@ -4220,7 +4220,7 @@
               <a:spcAft>
                 <a:spcPts val="0"/>
               </a:spcAft>
-              <a:defRPr sz="1400">
+              <a:defRPr sz="3600">
                 <a:solidFill>
                   <a:srgbClr val="FFFFFF"/>
                 </a:solidFill>
@@ -4295,7 +4295,7 @@
               <a:spcAft>
                 <a:spcPts val="0"/>
               </a:spcAft>
-              <a:defRPr sz="1400">
+              <a:defRPr sz="3600">
                 <a:solidFill>
                   <a:srgbClr val="FFFFFF"/>
                 </a:solidFill>
@@ -4370,7 +4370,7 @@
               <a:spcAft>
                 <a:spcPts val="0"/>
               </a:spcAft>
-              <a:defRPr sz="1400">
+              <a:defRPr sz="3600">
                 <a:solidFill>
                   <a:srgbClr val="FFFFFF"/>
                 </a:solidFill>
@@ -4445,7 +4445,7 @@
               <a:spcAft>
                 <a:spcPts val="0"/>
               </a:spcAft>
-              <a:defRPr sz="1400">
+              <a:defRPr sz="3600">
                 <a:solidFill>
                   <a:srgbClr val="FFFFFF"/>
                 </a:solidFill>
@@ -4520,7 +4520,7 @@
               <a:spcAft>
                 <a:spcPts val="0"/>
               </a:spcAft>
-              <a:defRPr sz="1400">
+              <a:defRPr sz="3600">
                 <a:solidFill>
                   <a:srgbClr val="FFFFFF"/>
                 </a:solidFill>
@@ -4595,7 +4595,7 @@
               <a:spcAft>
                 <a:spcPts val="0"/>
               </a:spcAft>
-              <a:defRPr sz="1400">
+              <a:defRPr sz="3600">
                 <a:solidFill>
                   <a:srgbClr val="FFFFFF"/>
                 </a:solidFill>
@@ -4674,7 +4674,7 @@
               <a:spcAft>
                 <a:spcPts val="0"/>
               </a:spcAft>
-              <a:defRPr sz="1400">
+              <a:defRPr sz="3600">
                 <a:solidFill>
                   <a:srgbClr val="FFFFFF"/>
                 </a:solidFill>

</xml_diff>

<commit_message>
All login codes are now 6 digits
</commit_message>
<xml_diff>
--- a/temp.pptx
+++ b/temp.pptx
@@ -13,19 +13,6 @@
     <p:sldId id="261" r:id="rId12"/>
     <p:sldId id="262" r:id="rId13"/>
     <p:sldId id="263" r:id="rId14"/>
-    <p:sldId id="264" r:id="rId15"/>
-    <p:sldId id="265" r:id="rId16"/>
-    <p:sldId id="266" r:id="rId17"/>
-    <p:sldId id="267" r:id="rId18"/>
-    <p:sldId id="268" r:id="rId19"/>
-    <p:sldId id="269" r:id="rId20"/>
-    <p:sldId id="270" r:id="rId21"/>
-    <p:sldId id="271" r:id="rId22"/>
-    <p:sldId id="272" r:id="rId23"/>
-    <p:sldId id="273" r:id="rId24"/>
-    <p:sldId id="274" r:id="rId25"/>
-    <p:sldId id="275" r:id="rId26"/>
-    <p:sldId id="276" r:id="rId27"/>
   </p:sldIdLst>
   <p:sldSz cx="9144000" cy="6858000" type="screen4x3"/>
   <p:notesSz cx="6858000" cy="9144000"/>
@@ -3155,9 +3142,6 @@
                 <a:latin typeface="Arial"/>
               </a:defRPr>
             </a:pPr>
-            <a:r>
-              <a:t>See the Destined Day Arise</a:t>
-            </a:r>
           </a:p>
           <a:p>
             <a:pPr algn="ctr">
@@ -3179,760 +3163,6 @@
             </a:pPr>
             <a:r>
               <a:t>Sovereign Grace Music</a:t>
-            </a:r>
-          </a:p>
-        </p:txBody>
-      </p:sp>
-    </p:spTree>
-  </p:cSld>
-  <p:clrMapOvr>
-    <a:masterClrMapping/>
-  </p:clrMapOvr>
-</p:sld>
-</file>
-
-<file path=ppt/slides/slide10.xml><?xml version="1.0" encoding="utf-8"?>
-<p:sld xmlns:a="http://schemas.openxmlformats.org/drawingml/2006/main" xmlns:p="http://schemas.openxmlformats.org/presentationml/2006/main" xmlns:r="http://schemas.openxmlformats.org/officeDocument/2006/relationships">
-  <p:cSld>
-    <p:bg>
-      <p:bgPr>
-        <a:solidFill>
-          <a:srgbClr val="000000"/>
-        </a:solidFill>
-        <a:effectLst/>
-      </p:bgPr>
-    </p:bg>
-    <p:spTree>
-      <p:nvGrpSpPr>
-        <p:cNvPr id="1" name=""/>
-        <p:cNvGrpSpPr/>
-        <p:nvPr/>
-      </p:nvGrpSpPr>
-      <p:grpSpPr/>
-      <p:sp>
-        <p:nvSpPr>
-          <p:cNvPr id="2" name="TextBox 1"/>
-          <p:cNvSpPr txBox="1"/>
-          <p:nvPr/>
-        </p:nvSpPr>
-        <p:spPr>
-          <a:xfrm>
-            <a:off x="2743200" y="2514600"/>
-            <a:ext cx="3657600" cy="1828800"/>
-          </a:xfrm>
-          <a:prstGeom prst="rect">
-            <a:avLst/>
-          </a:prstGeom>
-          <a:noFill/>
-        </p:spPr>
-        <p:txBody>
-          <a:bodyPr wrap="none">
-            <a:spAutoFit/>
-          </a:bodyPr>
-          <a:lstStyle/>
-          <a:p>
-            <a:pPr algn="ctr">
-              <a:lnSpc>
-                <a:spcPct val="150000"/>
-              </a:lnSpc>
-              <a:spcBef>
-                <a:spcPts val="0"/>
-              </a:spcBef>
-              <a:spcAft>
-                <a:spcPts val="0"/>
-              </a:spcAft>
-              <a:defRPr sz="3600">
-                <a:solidFill>
-                  <a:srgbClr val="FFFFFF"/>
-                </a:solidFill>
-                <a:latin typeface="Arial"/>
-              </a:defRPr>
-            </a:pPr>
-            <a:r>
-              <a:t>Slain for us, the water flowed</a:t>
-            </a:r>
-            <a:br/>
-            <a:r>
-              <a:t>Mingled from Your side with blood</a:t>
-            </a:r>
-          </a:p>
-        </p:txBody>
-      </p:sp>
-    </p:spTree>
-  </p:cSld>
-  <p:clrMapOvr>
-    <a:masterClrMapping/>
-  </p:clrMapOvr>
-</p:sld>
-</file>
-
-<file path=ppt/slides/slide11.xml><?xml version="1.0" encoding="utf-8"?>
-<p:sld xmlns:a="http://schemas.openxmlformats.org/drawingml/2006/main" xmlns:p="http://schemas.openxmlformats.org/presentationml/2006/main" xmlns:r="http://schemas.openxmlformats.org/officeDocument/2006/relationships">
-  <p:cSld>
-    <p:bg>
-      <p:bgPr>
-        <a:solidFill>
-          <a:srgbClr val="000000"/>
-        </a:solidFill>
-        <a:effectLst/>
-      </p:bgPr>
-    </p:bg>
-    <p:spTree>
-      <p:nvGrpSpPr>
-        <p:cNvPr id="1" name=""/>
-        <p:cNvGrpSpPr/>
-        <p:nvPr/>
-      </p:nvGrpSpPr>
-      <p:grpSpPr/>
-      <p:sp>
-        <p:nvSpPr>
-          <p:cNvPr id="2" name="TextBox 1"/>
-          <p:cNvSpPr txBox="1"/>
-          <p:nvPr/>
-        </p:nvSpPr>
-        <p:spPr>
-          <a:xfrm>
-            <a:off x="2743200" y="2514600"/>
-            <a:ext cx="3657600" cy="1828800"/>
-          </a:xfrm>
-          <a:prstGeom prst="rect">
-            <a:avLst/>
-          </a:prstGeom>
-          <a:noFill/>
-        </p:spPr>
-        <p:txBody>
-          <a:bodyPr wrap="none">
-            <a:spAutoFit/>
-          </a:bodyPr>
-          <a:lstStyle/>
-          <a:p>
-            <a:pPr algn="ctr">
-              <a:lnSpc>
-                <a:spcPct val="150000"/>
-              </a:lnSpc>
-              <a:spcBef>
-                <a:spcPts val="0"/>
-              </a:spcBef>
-              <a:spcAft>
-                <a:spcPts val="0"/>
-              </a:spcAft>
-              <a:defRPr sz="3600">
-                <a:solidFill>
-                  <a:srgbClr val="FFFFFF"/>
-                </a:solidFill>
-                <a:latin typeface="Arial"/>
-              </a:defRPr>
-            </a:pPr>
-            <a:r>
-              <a:t>Sign to all attesting eyes</a:t>
-            </a:r>
-            <a:br/>
-            <a:r>
-              <a:t>Of the finished sacrifice</a:t>
-            </a:r>
-          </a:p>
-        </p:txBody>
-      </p:sp>
-    </p:spTree>
-  </p:cSld>
-  <p:clrMapOvr>
-    <a:masterClrMapping/>
-  </p:clrMapOvr>
-</p:sld>
-</file>
-
-<file path=ppt/slides/slide12.xml><?xml version="1.0" encoding="utf-8"?>
-<p:sld xmlns:a="http://schemas.openxmlformats.org/drawingml/2006/main" xmlns:p="http://schemas.openxmlformats.org/presentationml/2006/main" xmlns:r="http://schemas.openxmlformats.org/officeDocument/2006/relationships">
-  <p:cSld>
-    <p:bg>
-      <p:bgPr>
-        <a:solidFill>
-          <a:srgbClr val="000000"/>
-        </a:solidFill>
-        <a:effectLst/>
-      </p:bgPr>
-    </p:bg>
-    <p:spTree>
-      <p:nvGrpSpPr>
-        <p:cNvPr id="1" name=""/>
-        <p:cNvGrpSpPr/>
-        <p:nvPr/>
-      </p:nvGrpSpPr>
-      <p:grpSpPr/>
-      <p:sp>
-        <p:nvSpPr>
-          <p:cNvPr id="2" name="TextBox 1"/>
-          <p:cNvSpPr txBox="1"/>
-          <p:nvPr/>
-        </p:nvSpPr>
-        <p:spPr>
-          <a:xfrm>
-            <a:off x="2743200" y="2514600"/>
-            <a:ext cx="3657600" cy="1828800"/>
-          </a:xfrm>
-          <a:prstGeom prst="rect">
-            <a:avLst/>
-          </a:prstGeom>
-          <a:noFill/>
-        </p:spPr>
-        <p:txBody>
-          <a:bodyPr wrap="none">
-            <a:spAutoFit/>
-          </a:bodyPr>
-          <a:lstStyle/>
-          <a:p>
-            <a:pPr algn="ctr">
-              <a:lnSpc>
-                <a:spcPct val="150000"/>
-              </a:lnSpc>
-              <a:spcBef>
-                <a:spcPts val="0"/>
-              </a:spcBef>
-              <a:spcAft>
-                <a:spcPts val="0"/>
-              </a:spcAft>
-              <a:defRPr sz="3600">
-                <a:solidFill>
-                  <a:srgbClr val="FFFFFF"/>
-                </a:solidFill>
-                <a:latin typeface="Arial"/>
-              </a:defRPr>
-            </a:pPr>
-            <a:r>
-              <a:t>Hallelujah! Hallelujah!</a:t>
-            </a:r>
-            <a:br/>
-            <a:r>
-              <a:t>Lamb of God for sinners slain</a:t>
-            </a:r>
-          </a:p>
-        </p:txBody>
-      </p:sp>
-    </p:spTree>
-  </p:cSld>
-  <p:clrMapOvr>
-    <a:masterClrMapping/>
-  </p:clrMapOvr>
-</p:sld>
-</file>
-
-<file path=ppt/slides/slide13.xml><?xml version="1.0" encoding="utf-8"?>
-<p:sld xmlns:a="http://schemas.openxmlformats.org/drawingml/2006/main" xmlns:p="http://schemas.openxmlformats.org/presentationml/2006/main" xmlns:r="http://schemas.openxmlformats.org/officeDocument/2006/relationships">
-  <p:cSld>
-    <p:bg>
-      <p:bgPr>
-        <a:solidFill>
-          <a:srgbClr val="000000"/>
-        </a:solidFill>
-        <a:effectLst/>
-      </p:bgPr>
-    </p:bg>
-    <p:spTree>
-      <p:nvGrpSpPr>
-        <p:cNvPr id="1" name=""/>
-        <p:cNvGrpSpPr/>
-        <p:nvPr/>
-      </p:nvGrpSpPr>
-      <p:grpSpPr/>
-      <p:sp>
-        <p:nvSpPr>
-          <p:cNvPr id="2" name="TextBox 1"/>
-          <p:cNvSpPr txBox="1"/>
-          <p:nvPr/>
-        </p:nvSpPr>
-        <p:spPr>
-          <a:xfrm>
-            <a:off x="2743200" y="2514600"/>
-            <a:ext cx="3657600" cy="1828800"/>
-          </a:xfrm>
-          <a:prstGeom prst="rect">
-            <a:avLst/>
-          </a:prstGeom>
-          <a:noFill/>
-        </p:spPr>
-        <p:txBody>
-          <a:bodyPr wrap="none">
-            <a:spAutoFit/>
-          </a:bodyPr>
-          <a:lstStyle/>
-          <a:p>
-            <a:pPr algn="ctr">
-              <a:lnSpc>
-                <a:spcPct val="150000"/>
-              </a:lnSpc>
-              <a:spcBef>
-                <a:spcPts val="0"/>
-              </a:spcBef>
-              <a:spcAft>
-                <a:spcPts val="0"/>
-              </a:spcAft>
-              <a:defRPr sz="3600">
-                <a:solidFill>
-                  <a:srgbClr val="FFFFFF"/>
-                </a:solidFill>
-                <a:latin typeface="Arial"/>
-              </a:defRPr>
-            </a:pPr>
-            <a:r>
-              <a:t>Hallelujah! Hallelujah!</a:t>
-            </a:r>
-            <a:br/>
-            <a:r>
-              <a:t>Jesus Christ, we praise Your name</a:t>
-            </a:r>
-          </a:p>
-        </p:txBody>
-      </p:sp>
-    </p:spTree>
-  </p:cSld>
-  <p:clrMapOvr>
-    <a:masterClrMapping/>
-  </p:clrMapOvr>
-</p:sld>
-</file>
-
-<file path=ppt/slides/slide14.xml><?xml version="1.0" encoding="utf-8"?>
-<p:sld xmlns:a="http://schemas.openxmlformats.org/drawingml/2006/main" xmlns:p="http://schemas.openxmlformats.org/presentationml/2006/main" xmlns:r="http://schemas.openxmlformats.org/officeDocument/2006/relationships">
-  <p:cSld>
-    <p:bg>
-      <p:bgPr>
-        <a:solidFill>
-          <a:srgbClr val="000000"/>
-        </a:solidFill>
-        <a:effectLst/>
-      </p:bgPr>
-    </p:bg>
-    <p:spTree>
-      <p:nvGrpSpPr>
-        <p:cNvPr id="1" name=""/>
-        <p:cNvGrpSpPr/>
-        <p:nvPr/>
-      </p:nvGrpSpPr>
-      <p:grpSpPr/>
-      <p:sp>
-        <p:nvSpPr>
-          <p:cNvPr id="2" name="TextBox 1"/>
-          <p:cNvSpPr txBox="1"/>
-          <p:nvPr/>
-        </p:nvSpPr>
-        <p:spPr>
-          <a:xfrm>
-            <a:off x="2743200" y="2514600"/>
-            <a:ext cx="3657600" cy="1828800"/>
-          </a:xfrm>
-          <a:prstGeom prst="rect">
-            <a:avLst/>
-          </a:prstGeom>
-          <a:noFill/>
-        </p:spPr>
-        <p:txBody>
-          <a:bodyPr wrap="none">
-            <a:spAutoFit/>
-          </a:bodyPr>
-          <a:lstStyle/>
-          <a:p>
-            <a:pPr algn="ctr">
-              <a:lnSpc>
-                <a:spcPct val="150000"/>
-              </a:lnSpc>
-              <a:spcBef>
-                <a:spcPts val="0"/>
-              </a:spcBef>
-              <a:spcAft>
-                <a:spcPts val="0"/>
-              </a:spcAft>
-              <a:defRPr sz="3600">
-                <a:solidFill>
-                  <a:srgbClr val="FFFFFF"/>
-                </a:solidFill>
-                <a:latin typeface="Arial"/>
-              </a:defRPr>
-            </a:pPr>
-            <a:r>
-              <a:t>Holy Jesus, grant us grace</a:t>
-            </a:r>
-            <a:br/>
-            <a:r>
-              <a:t>In that sacrifice to place</a:t>
-            </a:r>
-          </a:p>
-        </p:txBody>
-      </p:sp>
-    </p:spTree>
-  </p:cSld>
-  <p:clrMapOvr>
-    <a:masterClrMapping/>
-  </p:clrMapOvr>
-</p:sld>
-</file>
-
-<file path=ppt/slides/slide15.xml><?xml version="1.0" encoding="utf-8"?>
-<p:sld xmlns:a="http://schemas.openxmlformats.org/drawingml/2006/main" xmlns:p="http://schemas.openxmlformats.org/presentationml/2006/main" xmlns:r="http://schemas.openxmlformats.org/officeDocument/2006/relationships">
-  <p:cSld>
-    <p:bg>
-      <p:bgPr>
-        <a:solidFill>
-          <a:srgbClr val="000000"/>
-        </a:solidFill>
-        <a:effectLst/>
-      </p:bgPr>
-    </p:bg>
-    <p:spTree>
-      <p:nvGrpSpPr>
-        <p:cNvPr id="1" name=""/>
-        <p:cNvGrpSpPr/>
-        <p:nvPr/>
-      </p:nvGrpSpPr>
-      <p:grpSpPr/>
-      <p:sp>
-        <p:nvSpPr>
-          <p:cNvPr id="2" name="TextBox 1"/>
-          <p:cNvSpPr txBox="1"/>
-          <p:nvPr/>
-        </p:nvSpPr>
-        <p:spPr>
-          <a:xfrm>
-            <a:off x="2743200" y="2514600"/>
-            <a:ext cx="3657600" cy="1828800"/>
-          </a:xfrm>
-          <a:prstGeom prst="rect">
-            <a:avLst/>
-          </a:prstGeom>
-          <a:noFill/>
-        </p:spPr>
-        <p:txBody>
-          <a:bodyPr wrap="none">
-            <a:spAutoFit/>
-          </a:bodyPr>
-          <a:lstStyle/>
-          <a:p>
-            <a:pPr algn="ctr">
-              <a:lnSpc>
-                <a:spcPct val="150000"/>
-              </a:lnSpc>
-              <a:spcBef>
-                <a:spcPts val="0"/>
-              </a:spcBef>
-              <a:spcAft>
-                <a:spcPts val="0"/>
-              </a:spcAft>
-              <a:defRPr sz="3600">
-                <a:solidFill>
-                  <a:srgbClr val="FFFFFF"/>
-                </a:solidFill>
-                <a:latin typeface="Arial"/>
-              </a:defRPr>
-            </a:pPr>
-            <a:r>
-              <a:t>All our trust for life renewed</a:t>
-            </a:r>
-            <a:br/>
-            <a:r>
-              <a:t>Pardoned sin, and promised good</a:t>
-            </a:r>
-          </a:p>
-        </p:txBody>
-      </p:sp>
-    </p:spTree>
-  </p:cSld>
-  <p:clrMapOvr>
-    <a:masterClrMapping/>
-  </p:clrMapOvr>
-</p:sld>
-</file>
-
-<file path=ppt/slides/slide16.xml><?xml version="1.0" encoding="utf-8"?>
-<p:sld xmlns:a="http://schemas.openxmlformats.org/drawingml/2006/main" xmlns:p="http://schemas.openxmlformats.org/presentationml/2006/main" xmlns:r="http://schemas.openxmlformats.org/officeDocument/2006/relationships">
-  <p:cSld>
-    <p:bg>
-      <p:bgPr>
-        <a:solidFill>
-          <a:srgbClr val="000000"/>
-        </a:solidFill>
-        <a:effectLst/>
-      </p:bgPr>
-    </p:bg>
-    <p:spTree>
-      <p:nvGrpSpPr>
-        <p:cNvPr id="1" name=""/>
-        <p:cNvGrpSpPr/>
-        <p:nvPr/>
-      </p:nvGrpSpPr>
-      <p:grpSpPr/>
-      <p:sp>
-        <p:nvSpPr>
-          <p:cNvPr id="2" name="TextBox 1"/>
-          <p:cNvSpPr txBox="1"/>
-          <p:nvPr/>
-        </p:nvSpPr>
-        <p:spPr>
-          <a:xfrm>
-            <a:off x="2743200" y="2514600"/>
-            <a:ext cx="3657600" cy="1828800"/>
-          </a:xfrm>
-          <a:prstGeom prst="rect">
-            <a:avLst/>
-          </a:prstGeom>
-          <a:noFill/>
-        </p:spPr>
-        <p:txBody>
-          <a:bodyPr wrap="none">
-            <a:spAutoFit/>
-          </a:bodyPr>
-          <a:lstStyle/>
-          <a:p>
-            <a:pPr algn="ctr">
-              <a:lnSpc>
-                <a:spcPct val="150000"/>
-              </a:lnSpc>
-              <a:spcBef>
-                <a:spcPts val="0"/>
-              </a:spcBef>
-              <a:spcAft>
-                <a:spcPts val="0"/>
-              </a:spcAft>
-              <a:defRPr sz="3600">
-                <a:solidFill>
-                  <a:srgbClr val="FFFFFF"/>
-                </a:solidFill>
-                <a:latin typeface="Arial"/>
-              </a:defRPr>
-            </a:pPr>
-            <a:r>
-              <a:t>Grant us grace to sing Your praise</a:t>
-            </a:r>
-            <a:br/>
-            <a:r>
-              <a:t>'Round Your throne through endless days</a:t>
-            </a:r>
-          </a:p>
-        </p:txBody>
-      </p:sp>
-    </p:spTree>
-  </p:cSld>
-  <p:clrMapOvr>
-    <a:masterClrMapping/>
-  </p:clrMapOvr>
-</p:sld>
-</file>
-
-<file path=ppt/slides/slide17.xml><?xml version="1.0" encoding="utf-8"?>
-<p:sld xmlns:a="http://schemas.openxmlformats.org/drawingml/2006/main" xmlns:p="http://schemas.openxmlformats.org/presentationml/2006/main" xmlns:r="http://schemas.openxmlformats.org/officeDocument/2006/relationships">
-  <p:cSld>
-    <p:bg>
-      <p:bgPr>
-        <a:solidFill>
-          <a:srgbClr val="000000"/>
-        </a:solidFill>
-        <a:effectLst/>
-      </p:bgPr>
-    </p:bg>
-    <p:spTree>
-      <p:nvGrpSpPr>
-        <p:cNvPr id="1" name=""/>
-        <p:cNvGrpSpPr/>
-        <p:nvPr/>
-      </p:nvGrpSpPr>
-      <p:grpSpPr/>
-      <p:sp>
-        <p:nvSpPr>
-          <p:cNvPr id="2" name="TextBox 1"/>
-          <p:cNvSpPr txBox="1"/>
-          <p:nvPr/>
-        </p:nvSpPr>
-        <p:spPr>
-          <a:xfrm>
-            <a:off x="2743200" y="2514600"/>
-            <a:ext cx="3657600" cy="1828800"/>
-          </a:xfrm>
-          <a:prstGeom prst="rect">
-            <a:avLst/>
-          </a:prstGeom>
-          <a:noFill/>
-        </p:spPr>
-        <p:txBody>
-          <a:bodyPr wrap="none">
-            <a:spAutoFit/>
-          </a:bodyPr>
-          <a:lstStyle/>
-          <a:p>
-            <a:pPr algn="ctr">
-              <a:lnSpc>
-                <a:spcPct val="150000"/>
-              </a:lnSpc>
-              <a:spcBef>
-                <a:spcPts val="0"/>
-              </a:spcBef>
-              <a:spcAft>
-                <a:spcPts val="0"/>
-              </a:spcAft>
-              <a:defRPr sz="3600">
-                <a:solidFill>
-                  <a:srgbClr val="FFFFFF"/>
-                </a:solidFill>
-                <a:latin typeface="Arial"/>
-              </a:defRPr>
-            </a:pPr>
-            <a:r>
-              <a:t>Ever with the sons of light</a:t>
-            </a:r>
-            <a:br/>
-            <a:r>
-              <a:t>Blessing, honor, glory, might</a:t>
-            </a:r>
-          </a:p>
-        </p:txBody>
-      </p:sp>
-    </p:spTree>
-  </p:cSld>
-  <p:clrMapOvr>
-    <a:masterClrMapping/>
-  </p:clrMapOvr>
-</p:sld>
-</file>
-
-<file path=ppt/slides/slide18.xml><?xml version="1.0" encoding="utf-8"?>
-<p:sld xmlns:a="http://schemas.openxmlformats.org/drawingml/2006/main" xmlns:p="http://schemas.openxmlformats.org/presentationml/2006/main" xmlns:r="http://schemas.openxmlformats.org/officeDocument/2006/relationships">
-  <p:cSld>
-    <p:bg>
-      <p:bgPr>
-        <a:solidFill>
-          <a:srgbClr val="000000"/>
-        </a:solidFill>
-        <a:effectLst/>
-      </p:bgPr>
-    </p:bg>
-    <p:spTree>
-      <p:nvGrpSpPr>
-        <p:cNvPr id="1" name=""/>
-        <p:cNvGrpSpPr/>
-        <p:nvPr/>
-      </p:nvGrpSpPr>
-      <p:grpSpPr/>
-      <p:sp>
-        <p:nvSpPr>
-          <p:cNvPr id="2" name="TextBox 1"/>
-          <p:cNvSpPr txBox="1"/>
-          <p:nvPr/>
-        </p:nvSpPr>
-        <p:spPr>
-          <a:xfrm>
-            <a:off x="2743200" y="2514600"/>
-            <a:ext cx="3657600" cy="1828800"/>
-          </a:xfrm>
-          <a:prstGeom prst="rect">
-            <a:avLst/>
-          </a:prstGeom>
-          <a:noFill/>
-        </p:spPr>
-        <p:txBody>
-          <a:bodyPr wrap="none">
-            <a:spAutoFit/>
-          </a:bodyPr>
-          <a:lstStyle/>
-          <a:p>
-            <a:pPr algn="ctr">
-              <a:lnSpc>
-                <a:spcPct val="150000"/>
-              </a:lnSpc>
-              <a:spcBef>
-                <a:spcPts val="0"/>
-              </a:spcBef>
-              <a:spcAft>
-                <a:spcPts val="0"/>
-              </a:spcAft>
-              <a:defRPr sz="3600">
-                <a:solidFill>
-                  <a:srgbClr val="FFFFFF"/>
-                </a:solidFill>
-                <a:latin typeface="Arial"/>
-              </a:defRPr>
-            </a:pPr>
-            <a:r>
-              <a:t>Hallelujah! Hallelujah!</a:t>
-            </a:r>
-            <a:br/>
-            <a:r>
-              <a:t>Lamb of God for sinners slain</a:t>
-            </a:r>
-          </a:p>
-        </p:txBody>
-      </p:sp>
-    </p:spTree>
-  </p:cSld>
-  <p:clrMapOvr>
-    <a:masterClrMapping/>
-  </p:clrMapOvr>
-</p:sld>
-</file>
-
-<file path=ppt/slides/slide19.xml><?xml version="1.0" encoding="utf-8"?>
-<p:sld xmlns:a="http://schemas.openxmlformats.org/drawingml/2006/main" xmlns:p="http://schemas.openxmlformats.org/presentationml/2006/main" xmlns:r="http://schemas.openxmlformats.org/officeDocument/2006/relationships">
-  <p:cSld>
-    <p:bg>
-      <p:bgPr>
-        <a:solidFill>
-          <a:srgbClr val="000000"/>
-        </a:solidFill>
-        <a:effectLst/>
-      </p:bgPr>
-    </p:bg>
-    <p:spTree>
-      <p:nvGrpSpPr>
-        <p:cNvPr id="1" name=""/>
-        <p:cNvGrpSpPr/>
-        <p:nvPr/>
-      </p:nvGrpSpPr>
-      <p:grpSpPr/>
-      <p:sp>
-        <p:nvSpPr>
-          <p:cNvPr id="2" name="TextBox 1"/>
-          <p:cNvSpPr txBox="1"/>
-          <p:nvPr/>
-        </p:nvSpPr>
-        <p:spPr>
-          <a:xfrm>
-            <a:off x="2743200" y="2057400"/>
-            <a:ext cx="3657600" cy="2743200"/>
-          </a:xfrm>
-          <a:prstGeom prst="rect">
-            <a:avLst/>
-          </a:prstGeom>
-          <a:noFill/>
-        </p:spPr>
-        <p:txBody>
-          <a:bodyPr wrap="none">
-            <a:spAutoFit/>
-          </a:bodyPr>
-          <a:lstStyle/>
-          <a:p>
-            <a:pPr algn="ctr">
-              <a:lnSpc>
-                <a:spcPct val="150000"/>
-              </a:lnSpc>
-              <a:spcBef>
-                <a:spcPts val="0"/>
-              </a:spcBef>
-              <a:spcAft>
-                <a:spcPts val="0"/>
-              </a:spcAft>
-              <a:defRPr sz="3600">
-                <a:solidFill>
-                  <a:srgbClr val="FFFFFF"/>
-                </a:solidFill>
-                <a:latin typeface="Arial"/>
-              </a:defRPr>
-            </a:pPr>
-            <a:r>
-              <a:t>Hallelujah! Hallelujah!</a:t>
-            </a:r>
-            <a:br/>
-            <a:r>
-              <a:t>Jesus Christ, we praise</a:t>
-            </a:r>
-            <a:br/>
-            <a:r>
-              <a:t>Your name (Hallelujah!)</a:t>
             </a:r>
           </a:p>
         </p:txBody>
@@ -3971,8 +3201,8 @@
         </p:nvSpPr>
         <p:spPr>
           <a:xfrm>
-            <a:off x="2743200" y="2514600"/>
-            <a:ext cx="3657600" cy="1828800"/>
+            <a:off x="2743200" y="1600200"/>
+            <a:ext cx="3657600" cy="3657600"/>
           </a:xfrm>
           <a:prstGeom prst="rect">
             <a:avLst/>
@@ -4003,161 +3233,19 @@
               </a:defRPr>
             </a:pPr>
             <a:r>
-              <a:t>See the destined day arise</a:t>
+              <a:t>O great God of highest heav'n</a:t>
             </a:r>
             <a:br/>
             <a:r>
-              <a:t>See a willing sacrifice</a:t>
-            </a:r>
-          </a:p>
-        </p:txBody>
-      </p:sp>
-    </p:spTree>
-  </p:cSld>
-  <p:clrMapOvr>
-    <a:masterClrMapping/>
-  </p:clrMapOvr>
-</p:sld>
-</file>
-
-<file path=ppt/slides/slide20.xml><?xml version="1.0" encoding="utf-8"?>
-<p:sld xmlns:a="http://schemas.openxmlformats.org/drawingml/2006/main" xmlns:p="http://schemas.openxmlformats.org/presentationml/2006/main" xmlns:r="http://schemas.openxmlformats.org/officeDocument/2006/relationships">
-  <p:cSld>
-    <p:bg>
-      <p:bgPr>
-        <a:solidFill>
-          <a:srgbClr val="000000"/>
-        </a:solidFill>
-        <a:effectLst/>
-      </p:bgPr>
-    </p:bg>
-    <p:spTree>
-      <p:nvGrpSpPr>
-        <p:cNvPr id="1" name=""/>
-        <p:cNvGrpSpPr/>
-        <p:nvPr/>
-      </p:nvGrpSpPr>
-      <p:grpSpPr/>
-      <p:sp>
-        <p:nvSpPr>
-          <p:cNvPr id="2" name="TextBox 1"/>
-          <p:cNvSpPr txBox="1"/>
-          <p:nvPr/>
-        </p:nvSpPr>
-        <p:spPr>
-          <a:xfrm>
-            <a:off x="2743200" y="2514600"/>
-            <a:ext cx="3657600" cy="1828800"/>
-          </a:xfrm>
-          <a:prstGeom prst="rect">
-            <a:avLst/>
-          </a:prstGeom>
-          <a:noFill/>
-        </p:spPr>
-        <p:txBody>
-          <a:bodyPr wrap="none">
-            <a:spAutoFit/>
-          </a:bodyPr>
-          <a:lstStyle/>
-          <a:p>
-            <a:pPr algn="ctr">
-              <a:lnSpc>
-                <a:spcPct val="150000"/>
-              </a:lnSpc>
-              <a:spcBef>
-                <a:spcPts val="0"/>
-              </a:spcBef>
-              <a:spcAft>
-                <a:spcPts val="0"/>
-              </a:spcAft>
-              <a:defRPr sz="3600">
-                <a:solidFill>
-                  <a:srgbClr val="FFFFFF"/>
-                </a:solidFill>
-                <a:latin typeface="Arial"/>
-              </a:defRPr>
-            </a:pPr>
-            <a:r>
-              <a:t>Hallelujah! Hallelujah!</a:t>
+              <a:t>Occupy my lowly heart</a:t>
             </a:r>
             <a:br/>
             <a:r>
-              <a:t>Lamb of God for sinners slain</a:t>
-            </a:r>
-          </a:p>
-        </p:txBody>
-      </p:sp>
-    </p:spTree>
-  </p:cSld>
-  <p:clrMapOvr>
-    <a:masterClrMapping/>
-  </p:clrMapOvr>
-</p:sld>
-</file>
-
-<file path=ppt/slides/slide21.xml><?xml version="1.0" encoding="utf-8"?>
-<p:sld xmlns:a="http://schemas.openxmlformats.org/drawingml/2006/main" xmlns:p="http://schemas.openxmlformats.org/presentationml/2006/main" xmlns:r="http://schemas.openxmlformats.org/officeDocument/2006/relationships">
-  <p:cSld>
-    <p:bg>
-      <p:bgPr>
-        <a:solidFill>
-          <a:srgbClr val="000000"/>
-        </a:solidFill>
-        <a:effectLst/>
-      </p:bgPr>
-    </p:bg>
-    <p:spTree>
-      <p:nvGrpSpPr>
-        <p:cNvPr id="1" name=""/>
-        <p:cNvGrpSpPr/>
-        <p:nvPr/>
-      </p:nvGrpSpPr>
-      <p:grpSpPr/>
-      <p:sp>
-        <p:nvSpPr>
-          <p:cNvPr id="2" name="TextBox 1"/>
-          <p:cNvSpPr txBox="1"/>
-          <p:nvPr/>
-        </p:nvSpPr>
-        <p:spPr>
-          <a:xfrm>
-            <a:off x="2743200" y="2514600"/>
-            <a:ext cx="3657600" cy="1828800"/>
-          </a:xfrm>
-          <a:prstGeom prst="rect">
-            <a:avLst/>
-          </a:prstGeom>
-          <a:noFill/>
-        </p:spPr>
-        <p:txBody>
-          <a:bodyPr wrap="none">
-            <a:spAutoFit/>
-          </a:bodyPr>
-          <a:lstStyle/>
-          <a:p>
-            <a:pPr algn="ctr">
-              <a:lnSpc>
-                <a:spcPct val="150000"/>
-              </a:lnSpc>
-              <a:spcBef>
-                <a:spcPts val="0"/>
-              </a:spcBef>
-              <a:spcAft>
-                <a:spcPts val="0"/>
-              </a:spcAft>
-              <a:defRPr sz="3600">
-                <a:solidFill>
-                  <a:srgbClr val="FFFFFF"/>
-                </a:solidFill>
-                <a:latin typeface="Arial"/>
-              </a:defRPr>
-            </a:pPr>
-            <a:r>
-              <a:t>Hallelujah! Hallelujah!</a:t>
+              <a:t>Own it all and reign supreme</a:t>
             </a:r>
             <a:br/>
             <a:r>
-              <a:t>Jesus Christ, we praise Your name</a:t>
+              <a:t>Conquer every rebel power</a:t>
             </a:r>
           </a:p>
         </p:txBody>
@@ -4196,8 +3284,8 @@
         </p:nvSpPr>
         <p:spPr>
           <a:xfrm>
-            <a:off x="2743200" y="2514600"/>
-            <a:ext cx="3657600" cy="1828800"/>
+            <a:off x="2743200" y="1600200"/>
+            <a:ext cx="3657600" cy="3657600"/>
           </a:xfrm>
           <a:prstGeom prst="rect">
             <a:avLst/>
@@ -4228,11 +3316,19 @@
               </a:defRPr>
             </a:pPr>
             <a:r>
-              <a:t>Jesus, to redeem our loss</a:t>
+              <a:t>Let no vice or sin remain</a:t>
             </a:r>
             <a:br/>
             <a:r>
-              <a:t>Hangs upon the shameful cross</a:t>
+              <a:t>That resists Your holy war</a:t>
+            </a:r>
+            <a:br/>
+            <a:r>
+              <a:t>You have loved and purchased me</a:t>
+            </a:r>
+            <a:br/>
+            <a:r>
+              <a:t>Make me Yours forevermore</a:t>
             </a:r>
           </a:p>
         </p:txBody>
@@ -4271,8 +3367,8 @@
         </p:nvSpPr>
         <p:spPr>
           <a:xfrm>
-            <a:off x="2743200" y="2514600"/>
-            <a:ext cx="3657600" cy="1828800"/>
+            <a:off x="2743200" y="1600200"/>
+            <a:ext cx="3657600" cy="3657600"/>
           </a:xfrm>
           <a:prstGeom prst="rect">
             <a:avLst/>
@@ -4303,11 +3399,19 @@
               </a:defRPr>
             </a:pPr>
             <a:r>
-              <a:t>Jesus, who but You could bear</a:t>
+              <a:t>I was blinded by my sin</a:t>
             </a:r>
             <a:br/>
             <a:r>
-              <a:t>Wrath so great and justice fair?</a:t>
+              <a:t>Had no ears to hear Your voice</a:t>
+            </a:r>
+            <a:br/>
+            <a:r>
+              <a:t>Did not know Your love within</a:t>
+            </a:r>
+            <a:br/>
+            <a:r>
+              <a:t>Had no taste for heaven's joys</a:t>
             </a:r>
           </a:p>
         </p:txBody>
@@ -4346,8 +3450,8 @@
         </p:nvSpPr>
         <p:spPr>
           <a:xfrm>
-            <a:off x="2743200" y="2514600"/>
-            <a:ext cx="3657600" cy="1828800"/>
+            <a:off x="2743200" y="1600200"/>
+            <a:ext cx="3657600" cy="3657600"/>
           </a:xfrm>
           <a:prstGeom prst="rect">
             <a:avLst/>
@@ -4378,11 +3482,19 @@
               </a:defRPr>
             </a:pPr>
             <a:r>
-              <a:t>Every pang and bitter throe</a:t>
+              <a:t>Then Your Spirit gave me life</a:t>
             </a:r>
             <a:br/>
             <a:r>
-              <a:t>Finishing Your life of woe</a:t>
+              <a:t>Opened up Your Word to me</a:t>
+            </a:r>
+            <a:br/>
+            <a:r>
+              <a:t>Through the gospel of Your Son</a:t>
+            </a:r>
+            <a:br/>
+            <a:r>
+              <a:t>Give me endless hope and peace</a:t>
             </a:r>
           </a:p>
         </p:txBody>
@@ -4421,8 +3533,8 @@
         </p:nvSpPr>
         <p:spPr>
           <a:xfrm>
-            <a:off x="2743200" y="2514600"/>
-            <a:ext cx="3657600" cy="1828800"/>
+            <a:off x="2743200" y="1600200"/>
+            <a:ext cx="3657600" cy="3657600"/>
           </a:xfrm>
           <a:prstGeom prst="rect">
             <a:avLst/>
@@ -4453,11 +3565,19 @@
               </a:defRPr>
             </a:pPr>
             <a:r>
-              <a:t>Hallelujah! Hallelujah!</a:t>
+              <a:t>Help me now to live a life</a:t>
             </a:r>
             <a:br/>
             <a:r>
-              <a:t>Lamb of God for sinners slain</a:t>
+              <a:t>That's dependent on Your grace</a:t>
+            </a:r>
+            <a:br/>
+            <a:r>
+              <a:t>Keep my heart and guard my soul</a:t>
+            </a:r>
+            <a:br/>
+            <a:r>
+              <a:t>From the evils that I face</a:t>
             </a:r>
           </a:p>
         </p:txBody>
@@ -4496,8 +3616,8 @@
         </p:nvSpPr>
         <p:spPr>
           <a:xfrm>
-            <a:off x="2743200" y="2514600"/>
-            <a:ext cx="3657600" cy="1828800"/>
+            <a:off x="2743200" y="1600200"/>
+            <a:ext cx="3657600" cy="3657600"/>
           </a:xfrm>
           <a:prstGeom prst="rect">
             <a:avLst/>
@@ -4528,11 +3648,19 @@
               </a:defRPr>
             </a:pPr>
             <a:r>
-              <a:t>Hallelujah! Hallelujah!</a:t>
+              <a:t>You are worthy to be praised</a:t>
             </a:r>
             <a:br/>
             <a:r>
-              <a:t>Jesus Christ, we praise Your name</a:t>
+              <a:t>With my every thought and deed</a:t>
+            </a:r>
+            <a:br/>
+            <a:r>
+              <a:t>O great God of highest heaven</a:t>
+            </a:r>
+            <a:br/>
+            <a:r>
+              <a:t>Glorify Your Name through me</a:t>
             </a:r>
           </a:p>
         </p:txBody>
@@ -4571,8 +3699,8 @@
         </p:nvSpPr>
         <p:spPr>
           <a:xfrm>
-            <a:off x="2743200" y="2057400"/>
-            <a:ext cx="3657600" cy="2743200"/>
+            <a:off x="2743200" y="1600200"/>
+            <a:ext cx="3657600" cy="3657600"/>
           </a:xfrm>
           <a:prstGeom prst="rect">
             <a:avLst/>
@@ -4603,90 +3731,19 @@
               </a:defRPr>
             </a:pPr>
             <a:r>
-              <a:t>Who but Christ had dared to drain</a:t>
+              <a:t>You are worthy to be praised</a:t>
             </a:r>
             <a:br/>
             <a:r>
-              <a:t>Steeped in gall, the cup of</a:t>
+              <a:t>With my every thought and deed</a:t>
             </a:r>
             <a:br/>
             <a:r>
-              <a:t>pain (no one else could do it)</a:t>
-            </a:r>
-          </a:p>
-        </p:txBody>
-      </p:sp>
-    </p:spTree>
-  </p:cSld>
-  <p:clrMapOvr>
-    <a:masterClrMapping/>
-  </p:clrMapOvr>
-</p:sld>
-</file>
-
-<file path=ppt/slides/slide9.xml><?xml version="1.0" encoding="utf-8"?>
-<p:sld xmlns:a="http://schemas.openxmlformats.org/drawingml/2006/main" xmlns:p="http://schemas.openxmlformats.org/presentationml/2006/main" xmlns:r="http://schemas.openxmlformats.org/officeDocument/2006/relationships">
-  <p:cSld>
-    <p:bg>
-      <p:bgPr>
-        <a:solidFill>
-          <a:srgbClr val="000000"/>
-        </a:solidFill>
-        <a:effectLst/>
-      </p:bgPr>
-    </p:bg>
-    <p:spTree>
-      <p:nvGrpSpPr>
-        <p:cNvPr id="1" name=""/>
-        <p:cNvGrpSpPr/>
-        <p:nvPr/>
-      </p:nvGrpSpPr>
-      <p:grpSpPr/>
-      <p:sp>
-        <p:nvSpPr>
-          <p:cNvPr id="2" name="TextBox 1"/>
-          <p:cNvSpPr txBox="1"/>
-          <p:nvPr/>
-        </p:nvSpPr>
-        <p:spPr>
-          <a:xfrm>
-            <a:off x="2743200" y="2514600"/>
-            <a:ext cx="3657600" cy="1828800"/>
-          </a:xfrm>
-          <a:prstGeom prst="rect">
-            <a:avLst/>
-          </a:prstGeom>
-          <a:noFill/>
-        </p:spPr>
-        <p:txBody>
-          <a:bodyPr wrap="none">
-            <a:spAutoFit/>
-          </a:bodyPr>
-          <a:lstStyle/>
-          <a:p>
-            <a:pPr algn="ctr">
-              <a:lnSpc>
-                <a:spcPct val="150000"/>
-              </a:lnSpc>
-              <a:spcBef>
-                <a:spcPts val="0"/>
-              </a:spcBef>
-              <a:spcAft>
-                <a:spcPts val="0"/>
-              </a:spcAft>
-              <a:defRPr sz="3600">
-                <a:solidFill>
-                  <a:srgbClr val="FFFFFF"/>
-                </a:solidFill>
-                <a:latin typeface="Arial"/>
-              </a:defRPr>
-            </a:pPr>
-            <a:r>
-              <a:t>And with tender body bear</a:t>
+              <a:t>O great God of highest heaven</a:t>
             </a:r>
             <a:br/>
             <a:r>
-              <a:t>Thorns and nails and piercing spear?</a:t>
+              <a:t>Glorify Your Name through me</a:t>
             </a:r>
           </a:p>
         </p:txBody>

</xml_diff>